<commit_message>
June community call presentation.
</commit_message>
<xml_diff>
--- a/PnP Transformation Process/Templates/Solution Assessment Report Presentation Template.pptx
+++ b/PnP Transformation Process/Templates/Solution Assessment Report Presentation Template.pptx
@@ -402,7 +402,7 @@
           <a:p>
             <a:fld id="{DE219B1A-AE41-483B-A766-69B9363DDA6A}" type="datetimeFigureOut">
               <a:rPr lang="en-US" smtClean="0"/>
-              <a:t>5/27/2015</a:t>
+              <a:t>6/5/2015</a:t>
             </a:fld>
             <a:endParaRPr lang="en-US" dirty="0"/>
           </a:p>
@@ -611,7 +611,7 @@
           <a:p>
             <a:fld id="{D51B1278-D92B-4AF3-A9C1-71DD298190CE}" type="datetimeFigureOut">
               <a:rPr lang="en-US" smtClean="0"/>
-              <a:t>5/27/2015</a:t>
+              <a:t>6/5/2015</a:t>
             </a:fld>
             <a:endParaRPr lang="en-US" dirty="0"/>
           </a:p>
@@ -1056,7 +1056,7 @@
                 </a:solidFill>
               </a:rPr>
               <a:pPr/>
-              <a:t>5/27/2015</a:t>
+              <a:t>6/5/2015</a:t>
             </a:fld>
             <a:endParaRPr lang="en-US" dirty="0">
               <a:solidFill>
@@ -1567,7 +1567,7 @@
           <a:p>
             <a:fld id="{68473890-5369-4E69-B44C-90DD4CAB69AD}" type="datetime1">
               <a:rPr lang="en-US" smtClean="0"/>
-              <a:t>5/27/2015</a:t>
+              <a:t>6/5/2015</a:t>
             </a:fld>
             <a:endParaRPr lang="en-US" dirty="0"/>
           </a:p>
@@ -1773,7 +1773,7 @@
           <a:p>
             <a:fld id="{85306D5F-351F-4846-AFC3-6489193B7E70}" type="datetime1">
               <a:rPr lang="en-US" smtClean="0"/>
-              <a:t>5/27/2015</a:t>
+              <a:t>6/5/2015</a:t>
             </a:fld>
             <a:endParaRPr lang="en-US" dirty="0"/>
           </a:p>
@@ -2011,7 +2011,7 @@
           <a:p>
             <a:fld id="{78983742-E41A-4F0B-AB80-F7CCE9F04312}" type="datetime1">
               <a:rPr lang="en-US" smtClean="0"/>
-              <a:t>5/27/2015</a:t>
+              <a:t>6/5/2015</a:t>
             </a:fld>
             <a:endParaRPr lang="en-US" dirty="0"/>
           </a:p>
@@ -2217,7 +2217,7 @@
           <a:p>
             <a:fld id="{4AE8C4F7-4397-4161-9F22-0B4AD96909C7}" type="datetime1">
               <a:rPr lang="en-US" smtClean="0"/>
-              <a:t>5/27/2015</a:t>
+              <a:t>6/5/2015</a:t>
             </a:fld>
             <a:endParaRPr lang="en-US" dirty="0"/>
           </a:p>
@@ -2423,7 +2423,7 @@
           <a:p>
             <a:fld id="{4AE8C4F7-4397-4161-9F22-0B4AD96909C7}" type="datetime1">
               <a:rPr lang="en-US" smtClean="0"/>
-              <a:t>5/27/2015</a:t>
+              <a:t>6/5/2015</a:t>
             </a:fld>
             <a:endParaRPr lang="en-US" dirty="0"/>
           </a:p>
@@ -2629,7 +2629,7 @@
           <a:p>
             <a:fld id="{AA3AF75D-25C3-42E7-9971-69168E23937F}" type="datetime1">
               <a:rPr lang="en-US" smtClean="0"/>
-              <a:t>5/27/2015</a:t>
+              <a:t>6/5/2015</a:t>
             </a:fld>
             <a:endParaRPr lang="en-US" dirty="0"/>
           </a:p>
@@ -2946,7 +2946,7 @@
           <a:p>
             <a:fld id="{309E6654-814A-4856-A67A-9683B5A2AE45}" type="datetime1">
               <a:rPr lang="en-US" smtClean="0"/>
-              <a:t>5/27/2015</a:t>
+              <a:t>6/5/2015</a:t>
             </a:fld>
             <a:endParaRPr lang="en-US" dirty="0"/>
           </a:p>
@@ -3404,7 +3404,7 @@
           <a:p>
             <a:fld id="{296C1CD7-3CE0-494C-9AEC-31D6728171B4}" type="datetime1">
               <a:rPr lang="en-US" smtClean="0"/>
-              <a:t>5/27/2015</a:t>
+              <a:t>6/5/2015</a:t>
             </a:fld>
             <a:endParaRPr lang="en-US" dirty="0"/>
           </a:p>
@@ -3738,7 +3738,7 @@
           <a:p>
             <a:fld id="{374D8680-9FDE-45BD-89DC-85FB6DA54DDA}" type="datetime1">
               <a:rPr lang="en-US" smtClean="0"/>
-              <a:t>5/27/2015</a:t>
+              <a:t>6/5/2015</a:t>
             </a:fld>
             <a:endParaRPr lang="en-US" dirty="0"/>
           </a:p>
@@ -3972,7 +3972,7 @@
           <a:p>
             <a:fld id="{E52A3622-CF2A-4CD0-83D5-292746669CDE}" type="datetime1">
               <a:rPr lang="en-US" smtClean="0"/>
-              <a:t>5/27/2015</a:t>
+              <a:t>6/5/2015</a:t>
             </a:fld>
             <a:endParaRPr lang="en-US" dirty="0"/>
           </a:p>
@@ -15890,7 +15890,7 @@
 </file>
 
 <file path=ppt/slides/slide15.xml><?xml version="1.0" encoding="utf-8"?>
-<p:sld xmlns:a="http://schemas.openxmlformats.org/drawingml/2006/main" xmlns:r="http://schemas.openxmlformats.org/officeDocument/2006/relationships" xmlns:p="http://schemas.openxmlformats.org/presentationml/2006/main">
+<p:sld xmlns:a="http://schemas.openxmlformats.org/drawingml/2006/main" xmlns:r="http://schemas.openxmlformats.org/officeDocument/2006/relationships" xmlns:p="http://schemas.openxmlformats.org/presentationml/2006/main" show="0">
   <p:cSld>
     <p:spTree>
       <p:nvGrpSpPr>
@@ -17738,7 +17738,7 @@
 </file>
 
 <file path=ppt/slides/slide2.xml><?xml version="1.0" encoding="utf-8"?>
-<p:sld xmlns:a="http://schemas.openxmlformats.org/drawingml/2006/main" xmlns:r="http://schemas.openxmlformats.org/officeDocument/2006/relationships" xmlns:p="http://schemas.openxmlformats.org/presentationml/2006/main">
+<p:sld xmlns:a="http://schemas.openxmlformats.org/drawingml/2006/main" xmlns:r="http://schemas.openxmlformats.org/officeDocument/2006/relationships" xmlns:p="http://schemas.openxmlformats.org/presentationml/2006/main" show="0">
   <p:cSld>
     <p:spTree>
       <p:nvGrpSpPr>
@@ -24031,7 +24031,7 @@
 </file>
 
 <file path=ppt/slides/slide37.xml><?xml version="1.0" encoding="utf-8"?>
-<p:sld xmlns:a="http://schemas.openxmlformats.org/drawingml/2006/main" xmlns:r="http://schemas.openxmlformats.org/officeDocument/2006/relationships" xmlns:p="http://schemas.openxmlformats.org/presentationml/2006/main">
+<p:sld xmlns:a="http://schemas.openxmlformats.org/drawingml/2006/main" xmlns:r="http://schemas.openxmlformats.org/officeDocument/2006/relationships" xmlns:p="http://schemas.openxmlformats.org/presentationml/2006/main" show="0">
   <p:cSld>
     <p:spTree>
       <p:nvGrpSpPr>
@@ -24452,15 +24452,7 @@
           <a:p>
             <a:r>
               <a:rPr lang="en-US" sz="3200" dirty="0" smtClean="0"/>
-              <a:t>There are a number of list templates, which all have to be migrated before transition to </a:t>
-            </a:r>
-            <a:r>
-              <a:rPr lang="en-US" sz="3200" dirty="0" smtClean="0"/>
-              <a:t>Office 365 </a:t>
-            </a:r>
-            <a:r>
-              <a:rPr lang="en-US" sz="3200" dirty="0" smtClean="0"/>
-              <a:t>can be performed</a:t>
+              <a:t>There are a number of list templates, which all have to be migrated before transition to Office 365 can be performed</a:t>
             </a:r>
           </a:p>
           <a:p>
@@ -24562,7 +24554,7 @@
 </file>
 
 <file path=ppt/slides/slide40.xml><?xml version="1.0" encoding="utf-8"?>
-<p:sld xmlns:a="http://schemas.openxmlformats.org/drawingml/2006/main" xmlns:r="http://schemas.openxmlformats.org/officeDocument/2006/relationships" xmlns:p="http://schemas.openxmlformats.org/presentationml/2006/main">
+<p:sld xmlns:a="http://schemas.openxmlformats.org/drawingml/2006/main" xmlns:r="http://schemas.openxmlformats.org/officeDocument/2006/relationships" xmlns:p="http://schemas.openxmlformats.org/presentationml/2006/main" show="0">
   <p:cSld>
     <p:spTree>
       <p:nvGrpSpPr>
@@ -24767,15 +24759,7 @@
           <a:p>
             <a:r>
               <a:rPr lang="en-US" dirty="0" smtClean="0"/>
-              <a:t>Solution 1 cannot be moved to </a:t>
-            </a:r>
-            <a:r>
-              <a:rPr lang="en-US" dirty="0" smtClean="0"/>
-              <a:t>Office 365 </a:t>
-            </a:r>
-            <a:r>
-              <a:rPr lang="en-US" dirty="0" smtClean="0"/>
-              <a:t>due to FTC usage</a:t>
+              <a:t>Solution 1 cannot be moved to Office 365 due to FTC usage</a:t>
             </a:r>
             <a:endParaRPr lang="nl-BE" dirty="0"/>
           </a:p>
@@ -25928,29 +25912,7 @@
                 </a:solidFill>
                 <a:cs typeface="Segoe UI" panose="020B0502040204020203" pitchFamily="34" charset="0"/>
               </a:rPr>
-              <a:t>Existing solution is pretty sophisticated and could be used to address business requirements with other approaches. Web templates should not be used in new </a:t>
-            </a:r>
-            <a:r>
-              <a:rPr lang="en-US" sz="1400" dirty="0" smtClean="0">
-                <a:solidFill>
-                  <a:schemeClr val="bg2">
-                    <a:lumMod val="50000"/>
-                  </a:schemeClr>
-                </a:solidFill>
-                <a:cs typeface="Segoe UI" panose="020B0502040204020203" pitchFamily="34" charset="0"/>
-              </a:rPr>
-              <a:t>Office 365 </a:t>
-            </a:r>
-            <a:r>
-              <a:rPr lang="en-US" sz="1400" dirty="0" smtClean="0">
-                <a:solidFill>
-                  <a:schemeClr val="bg2">
-                    <a:lumMod val="50000"/>
-                  </a:schemeClr>
-                </a:solidFill>
-                <a:cs typeface="Segoe UI" panose="020B0502040204020203" pitchFamily="34" charset="0"/>
-              </a:rPr>
-              <a:t>platform.</a:t>
+              <a:t>Existing solution is pretty sophisticated and could be used to address business requirements with other approaches. Web templates should not be used in new Office 365 platform.</a:t>
             </a:r>
           </a:p>
           <a:p>
@@ -26341,7 +26303,7 @@
 </file>
 
 <file path=ppt/slides/slide44.xml><?xml version="1.0" encoding="utf-8"?>
-<p:sld xmlns:a="http://schemas.openxmlformats.org/drawingml/2006/main" xmlns:r="http://schemas.openxmlformats.org/officeDocument/2006/relationships" xmlns:p="http://schemas.openxmlformats.org/presentationml/2006/main">
+<p:sld xmlns:a="http://schemas.openxmlformats.org/drawingml/2006/main" xmlns:r="http://schemas.openxmlformats.org/officeDocument/2006/relationships" xmlns:p="http://schemas.openxmlformats.org/presentationml/2006/main" show="0">
   <p:cSld>
     <p:spTree>
       <p:nvGrpSpPr>
@@ -26517,28 +26479,28 @@
                 <a:gridCol w="5965345">
                   <a:extLst>
                     <a:ext uri="{9D8B030D-6E8A-4147-A177-3AD203B41FA5}">
-                      <a16:colId xmlns:a16="http://schemas.microsoft.com/office/drawing/2014/main" xmlns="" val="20000"/>
+                      <a16:colId xmlns:a16="http://schemas.microsoft.com/office/drawing/2014/main" val="20000"/>
                     </a:ext>
                   </a:extLst>
                 </a:gridCol>
                 <a:gridCol w="568903">
                   <a:extLst>
                     <a:ext uri="{9D8B030D-6E8A-4147-A177-3AD203B41FA5}">
-                      <a16:colId xmlns:a16="http://schemas.microsoft.com/office/drawing/2014/main" xmlns="" val="20001"/>
+                      <a16:colId xmlns:a16="http://schemas.microsoft.com/office/drawing/2014/main" val="20001"/>
                     </a:ext>
                   </a:extLst>
                 </a:gridCol>
                 <a:gridCol w="520140">
                   <a:extLst>
                     <a:ext uri="{9D8B030D-6E8A-4147-A177-3AD203B41FA5}">
-                      <a16:colId xmlns:a16="http://schemas.microsoft.com/office/drawing/2014/main" xmlns="" val="20002"/>
+                      <a16:colId xmlns:a16="http://schemas.microsoft.com/office/drawing/2014/main" val="20002"/>
                     </a:ext>
                   </a:extLst>
                 </a:gridCol>
                 <a:gridCol w="520140">
                   <a:extLst>
                     <a:ext uri="{9D8B030D-6E8A-4147-A177-3AD203B41FA5}">
-                      <a16:colId xmlns:a16="http://schemas.microsoft.com/office/drawing/2014/main" xmlns="" val="2588272693"/>
+                      <a16:colId xmlns:a16="http://schemas.microsoft.com/office/drawing/2014/main" val="2588272693"/>
                     </a:ext>
                   </a:extLst>
                 </a:gridCol>
@@ -26644,7 +26606,7 @@
                 </a:tc>
                 <a:extLst>
                   <a:ext uri="{0D108BD9-81ED-4DB2-BD59-A6C34878D82A}">
-                    <a16:rowId xmlns:a16="http://schemas.microsoft.com/office/drawing/2014/main" xmlns="" val="10000"/>
+                    <a16:rowId xmlns:a16="http://schemas.microsoft.com/office/drawing/2014/main" val="10000"/>
                   </a:ext>
                 </a:extLst>
               </a:tr>
@@ -26753,7 +26715,7 @@
                 </a:tc>
                 <a:extLst>
                   <a:ext uri="{0D108BD9-81ED-4DB2-BD59-A6C34878D82A}">
-                    <a16:rowId xmlns:a16="http://schemas.microsoft.com/office/drawing/2014/main" xmlns="" val="10001"/>
+                    <a16:rowId xmlns:a16="http://schemas.microsoft.com/office/drawing/2014/main" val="10001"/>
                   </a:ext>
                 </a:extLst>
               </a:tr>
@@ -26867,7 +26829,7 @@
                 </a:tc>
                 <a:extLst>
                   <a:ext uri="{0D108BD9-81ED-4DB2-BD59-A6C34878D82A}">
-                    <a16:rowId xmlns:a16="http://schemas.microsoft.com/office/drawing/2014/main" xmlns="" val="10002"/>
+                    <a16:rowId xmlns:a16="http://schemas.microsoft.com/office/drawing/2014/main" val="10002"/>
                   </a:ext>
                 </a:extLst>
               </a:tr>
@@ -26981,7 +26943,7 @@
                 </a:tc>
                 <a:extLst>
                   <a:ext uri="{0D108BD9-81ED-4DB2-BD59-A6C34878D82A}">
-                    <a16:rowId xmlns:a16="http://schemas.microsoft.com/office/drawing/2014/main" xmlns="" val="10003"/>
+                    <a16:rowId xmlns:a16="http://schemas.microsoft.com/office/drawing/2014/main" val="10003"/>
                   </a:ext>
                 </a:extLst>
               </a:tr>
@@ -27095,7 +27057,7 @@
                 </a:tc>
                 <a:extLst>
                   <a:ext uri="{0D108BD9-81ED-4DB2-BD59-A6C34878D82A}">
-                    <a16:rowId xmlns:a16="http://schemas.microsoft.com/office/drawing/2014/main" xmlns="" val="10004"/>
+                    <a16:rowId xmlns:a16="http://schemas.microsoft.com/office/drawing/2014/main" val="10004"/>
                   </a:ext>
                 </a:extLst>
               </a:tr>
@@ -27209,7 +27171,7 @@
                 </a:tc>
                 <a:extLst>
                   <a:ext uri="{0D108BD9-81ED-4DB2-BD59-A6C34878D82A}">
-                    <a16:rowId xmlns:a16="http://schemas.microsoft.com/office/drawing/2014/main" xmlns="" val="10005"/>
+                    <a16:rowId xmlns:a16="http://schemas.microsoft.com/office/drawing/2014/main" val="10005"/>
                   </a:ext>
                 </a:extLst>
               </a:tr>
@@ -27323,7 +27285,7 @@
                 </a:tc>
                 <a:extLst>
                   <a:ext uri="{0D108BD9-81ED-4DB2-BD59-A6C34878D82A}">
-                    <a16:rowId xmlns:a16="http://schemas.microsoft.com/office/drawing/2014/main" xmlns="" val="10006"/>
+                    <a16:rowId xmlns:a16="http://schemas.microsoft.com/office/drawing/2014/main" val="10006"/>
                   </a:ext>
                 </a:extLst>
               </a:tr>
@@ -28465,28 +28427,28 @@
                 <a:gridCol w="5965345">
                   <a:extLst>
                     <a:ext uri="{9D8B030D-6E8A-4147-A177-3AD203B41FA5}">
-                      <a16:colId xmlns:a16="http://schemas.microsoft.com/office/drawing/2014/main" xmlns="" val="20000"/>
+                      <a16:colId xmlns:a16="http://schemas.microsoft.com/office/drawing/2014/main" val="20000"/>
                     </a:ext>
                   </a:extLst>
                 </a:gridCol>
                 <a:gridCol w="568903">
                   <a:extLst>
                     <a:ext uri="{9D8B030D-6E8A-4147-A177-3AD203B41FA5}">
-                      <a16:colId xmlns:a16="http://schemas.microsoft.com/office/drawing/2014/main" xmlns="" val="20001"/>
+                      <a16:colId xmlns:a16="http://schemas.microsoft.com/office/drawing/2014/main" val="20001"/>
                     </a:ext>
                   </a:extLst>
                 </a:gridCol>
                 <a:gridCol w="520140">
                   <a:extLst>
                     <a:ext uri="{9D8B030D-6E8A-4147-A177-3AD203B41FA5}">
-                      <a16:colId xmlns:a16="http://schemas.microsoft.com/office/drawing/2014/main" xmlns="" val="20002"/>
+                      <a16:colId xmlns:a16="http://schemas.microsoft.com/office/drawing/2014/main" val="20002"/>
                     </a:ext>
                   </a:extLst>
                 </a:gridCol>
                 <a:gridCol w="520140">
                   <a:extLst>
                     <a:ext uri="{9D8B030D-6E8A-4147-A177-3AD203B41FA5}">
-                      <a16:colId xmlns:a16="http://schemas.microsoft.com/office/drawing/2014/main" xmlns="" val="1173184688"/>
+                      <a16:colId xmlns:a16="http://schemas.microsoft.com/office/drawing/2014/main" val="1173184688"/>
                     </a:ext>
                   </a:extLst>
                 </a:gridCol>
@@ -28592,7 +28554,7 @@
                 </a:tc>
                 <a:extLst>
                   <a:ext uri="{0D108BD9-81ED-4DB2-BD59-A6C34878D82A}">
-                    <a16:rowId xmlns:a16="http://schemas.microsoft.com/office/drawing/2014/main" xmlns="" val="10000"/>
+                    <a16:rowId xmlns:a16="http://schemas.microsoft.com/office/drawing/2014/main" val="10000"/>
                   </a:ext>
                 </a:extLst>
               </a:tr>
@@ -28711,7 +28673,7 @@
                 </a:tc>
                 <a:extLst>
                   <a:ext uri="{0D108BD9-81ED-4DB2-BD59-A6C34878D82A}">
-                    <a16:rowId xmlns:a16="http://schemas.microsoft.com/office/drawing/2014/main" xmlns="" val="10001"/>
+                    <a16:rowId xmlns:a16="http://schemas.microsoft.com/office/drawing/2014/main" val="10001"/>
                   </a:ext>
                 </a:extLst>
               </a:tr>
@@ -28835,7 +28797,7 @@
                 </a:tc>
                 <a:extLst>
                   <a:ext uri="{0D108BD9-81ED-4DB2-BD59-A6C34878D82A}">
-                    <a16:rowId xmlns:a16="http://schemas.microsoft.com/office/drawing/2014/main" xmlns="" val="10002"/>
+                    <a16:rowId xmlns:a16="http://schemas.microsoft.com/office/drawing/2014/main" val="10002"/>
                   </a:ext>
                 </a:extLst>
               </a:tr>
@@ -28959,7 +28921,7 @@
                 </a:tc>
                 <a:extLst>
                   <a:ext uri="{0D108BD9-81ED-4DB2-BD59-A6C34878D82A}">
-                    <a16:rowId xmlns:a16="http://schemas.microsoft.com/office/drawing/2014/main" xmlns="" val="10003"/>
+                    <a16:rowId xmlns:a16="http://schemas.microsoft.com/office/drawing/2014/main" val="10003"/>
                   </a:ext>
                 </a:extLst>
               </a:tr>
@@ -29083,7 +29045,7 @@
                 </a:tc>
                 <a:extLst>
                   <a:ext uri="{0D108BD9-81ED-4DB2-BD59-A6C34878D82A}">
-                    <a16:rowId xmlns:a16="http://schemas.microsoft.com/office/drawing/2014/main" xmlns="" val="10004"/>
+                    <a16:rowId xmlns:a16="http://schemas.microsoft.com/office/drawing/2014/main" val="10004"/>
                   </a:ext>
                 </a:extLst>
               </a:tr>
@@ -29214,7 +29176,7 @@
                 </a:tc>
                 <a:extLst>
                   <a:ext uri="{0D108BD9-81ED-4DB2-BD59-A6C34878D82A}">
-                    <a16:rowId xmlns:a16="http://schemas.microsoft.com/office/drawing/2014/main" xmlns="" val="10005"/>
+                    <a16:rowId xmlns:a16="http://schemas.microsoft.com/office/drawing/2014/main" val="10005"/>
                   </a:ext>
                 </a:extLst>
               </a:tr>
@@ -30721,7 +30683,7 @@
                 <a:gridCol w="2373524">
                   <a:extLst>
                     <a:ext uri="{9D8B030D-6E8A-4147-A177-3AD203B41FA5}">
-                      <a16:colId xmlns="" xmlns:a16="http://schemas.microsoft.com/office/drawing/2014/main" val="20000"/>
+                      <a16:colId xmlns:a16="http://schemas.microsoft.com/office/drawing/2014/main" val="20000"/>
                     </a:ext>
                   </a:extLst>
                 </a:gridCol>
@@ -30784,7 +30746,7 @@
                 </a:tc>
                 <a:extLst>
                   <a:ext uri="{0D108BD9-81ED-4DB2-BD59-A6C34878D82A}">
-                    <a16:rowId xmlns="" xmlns:a16="http://schemas.microsoft.com/office/drawing/2014/main" val="10000"/>
+                    <a16:rowId xmlns:a16="http://schemas.microsoft.com/office/drawing/2014/main" val="10000"/>
                   </a:ext>
                 </a:extLst>
               </a:tr>
@@ -30845,7 +30807,7 @@
                 </a:tc>
                 <a:extLst>
                   <a:ext uri="{0D108BD9-81ED-4DB2-BD59-A6C34878D82A}">
-                    <a16:rowId xmlns="" xmlns:a16="http://schemas.microsoft.com/office/drawing/2014/main" val="10001"/>
+                    <a16:rowId xmlns:a16="http://schemas.microsoft.com/office/drawing/2014/main" val="10001"/>
                   </a:ext>
                 </a:extLst>
               </a:tr>
@@ -30915,7 +30877,7 @@
                 </a:tc>
                 <a:extLst>
                   <a:ext uri="{0D108BD9-81ED-4DB2-BD59-A6C34878D82A}">
-                    <a16:rowId xmlns="" xmlns:a16="http://schemas.microsoft.com/office/drawing/2014/main" val="10002"/>
+                    <a16:rowId xmlns:a16="http://schemas.microsoft.com/office/drawing/2014/main" val="10002"/>
                   </a:ext>
                 </a:extLst>
               </a:tr>
@@ -30993,7 +30955,7 @@
                 </a:tc>
                 <a:extLst>
                   <a:ext uri="{0D108BD9-81ED-4DB2-BD59-A6C34878D82A}">
-                    <a16:rowId xmlns="" xmlns:a16="http://schemas.microsoft.com/office/drawing/2014/main" val="10007"/>
+                    <a16:rowId xmlns:a16="http://schemas.microsoft.com/office/drawing/2014/main" val="10007"/>
                   </a:ext>
                 </a:extLst>
               </a:tr>
@@ -31445,7 +31407,7 @@
                 <a:gridCol w="2373524">
                   <a:extLst>
                     <a:ext uri="{9D8B030D-6E8A-4147-A177-3AD203B41FA5}">
-                      <a16:colId xmlns="" xmlns:a16="http://schemas.microsoft.com/office/drawing/2014/main" val="20000"/>
+                      <a16:colId xmlns:a16="http://schemas.microsoft.com/office/drawing/2014/main" val="20000"/>
                     </a:ext>
                   </a:extLst>
                 </a:gridCol>
@@ -31508,7 +31470,7 @@
                 </a:tc>
                 <a:extLst>
                   <a:ext uri="{0D108BD9-81ED-4DB2-BD59-A6C34878D82A}">
-                    <a16:rowId xmlns="" xmlns:a16="http://schemas.microsoft.com/office/drawing/2014/main" val="10000"/>
+                    <a16:rowId xmlns:a16="http://schemas.microsoft.com/office/drawing/2014/main" val="10000"/>
                   </a:ext>
                 </a:extLst>
               </a:tr>
@@ -31569,7 +31531,7 @@
                 </a:tc>
                 <a:extLst>
                   <a:ext uri="{0D108BD9-81ED-4DB2-BD59-A6C34878D82A}">
-                    <a16:rowId xmlns="" xmlns:a16="http://schemas.microsoft.com/office/drawing/2014/main" val="10001"/>
+                    <a16:rowId xmlns:a16="http://schemas.microsoft.com/office/drawing/2014/main" val="10001"/>
                   </a:ext>
                 </a:extLst>
               </a:tr>
@@ -31639,7 +31601,7 @@
                 </a:tc>
                 <a:extLst>
                   <a:ext uri="{0D108BD9-81ED-4DB2-BD59-A6C34878D82A}">
-                    <a16:rowId xmlns="" xmlns:a16="http://schemas.microsoft.com/office/drawing/2014/main" val="10002"/>
+                    <a16:rowId xmlns:a16="http://schemas.microsoft.com/office/drawing/2014/main" val="10002"/>
                   </a:ext>
                 </a:extLst>
               </a:tr>
@@ -31717,7 +31679,7 @@
                 </a:tc>
                 <a:extLst>
                   <a:ext uri="{0D108BD9-81ED-4DB2-BD59-A6C34878D82A}">
-                    <a16:rowId xmlns="" xmlns:a16="http://schemas.microsoft.com/office/drawing/2014/main" val="10007"/>
+                    <a16:rowId xmlns:a16="http://schemas.microsoft.com/office/drawing/2014/main" val="10007"/>
                   </a:ext>
                 </a:extLst>
               </a:tr>
@@ -32147,7 +32109,7 @@
                 <a:gridCol w="2373524">
                   <a:extLst>
                     <a:ext uri="{9D8B030D-6E8A-4147-A177-3AD203B41FA5}">
-                      <a16:colId xmlns="" xmlns:a16="http://schemas.microsoft.com/office/drawing/2014/main" val="20000"/>
+                      <a16:colId xmlns:a16="http://schemas.microsoft.com/office/drawing/2014/main" val="20000"/>
                     </a:ext>
                   </a:extLst>
                 </a:gridCol>
@@ -32210,7 +32172,7 @@
                 </a:tc>
                 <a:extLst>
                   <a:ext uri="{0D108BD9-81ED-4DB2-BD59-A6C34878D82A}">
-                    <a16:rowId xmlns="" xmlns:a16="http://schemas.microsoft.com/office/drawing/2014/main" val="10000"/>
+                    <a16:rowId xmlns:a16="http://schemas.microsoft.com/office/drawing/2014/main" val="10000"/>
                   </a:ext>
                 </a:extLst>
               </a:tr>
@@ -32271,7 +32233,7 @@
                 </a:tc>
                 <a:extLst>
                   <a:ext uri="{0D108BD9-81ED-4DB2-BD59-A6C34878D82A}">
-                    <a16:rowId xmlns="" xmlns:a16="http://schemas.microsoft.com/office/drawing/2014/main" val="10001"/>
+                    <a16:rowId xmlns:a16="http://schemas.microsoft.com/office/drawing/2014/main" val="10001"/>
                   </a:ext>
                 </a:extLst>
               </a:tr>
@@ -32341,7 +32303,7 @@
                 </a:tc>
                 <a:extLst>
                   <a:ext uri="{0D108BD9-81ED-4DB2-BD59-A6C34878D82A}">
-                    <a16:rowId xmlns="" xmlns:a16="http://schemas.microsoft.com/office/drawing/2014/main" val="10002"/>
+                    <a16:rowId xmlns:a16="http://schemas.microsoft.com/office/drawing/2014/main" val="10002"/>
                   </a:ext>
                 </a:extLst>
               </a:tr>
@@ -32419,7 +32381,7 @@
                 </a:tc>
                 <a:extLst>
                   <a:ext uri="{0D108BD9-81ED-4DB2-BD59-A6C34878D82A}">
-                    <a16:rowId xmlns="" xmlns:a16="http://schemas.microsoft.com/office/drawing/2014/main" val="10007"/>
+                    <a16:rowId xmlns:a16="http://schemas.microsoft.com/office/drawing/2014/main" val="10007"/>
                   </a:ext>
                 </a:extLst>
               </a:tr>
@@ -32492,7 +32454,7 @@
 </file>
 
 <file path=ppt/slides/slide5.xml><?xml version="1.0" encoding="utf-8"?>
-<p:sld xmlns:a="http://schemas.openxmlformats.org/drawingml/2006/main" xmlns:r="http://schemas.openxmlformats.org/officeDocument/2006/relationships" xmlns:p="http://schemas.openxmlformats.org/presentationml/2006/main">
+<p:sld xmlns:a="http://schemas.openxmlformats.org/drawingml/2006/main" xmlns:r="http://schemas.openxmlformats.org/officeDocument/2006/relationships" xmlns:p="http://schemas.openxmlformats.org/presentationml/2006/main" show="0">
   <p:cSld>
     <p:spTree>
       <p:nvGrpSpPr>
@@ -32751,7 +32713,7 @@
                 <a:gridCol w="2373524">
                   <a:extLst>
                     <a:ext uri="{9D8B030D-6E8A-4147-A177-3AD203B41FA5}">
-                      <a16:colId xmlns="" xmlns:a16="http://schemas.microsoft.com/office/drawing/2014/main" val="20000"/>
+                      <a16:colId xmlns:a16="http://schemas.microsoft.com/office/drawing/2014/main" val="20000"/>
                     </a:ext>
                   </a:extLst>
                 </a:gridCol>
@@ -32814,7 +32776,7 @@
                 </a:tc>
                 <a:extLst>
                   <a:ext uri="{0D108BD9-81ED-4DB2-BD59-A6C34878D82A}">
-                    <a16:rowId xmlns="" xmlns:a16="http://schemas.microsoft.com/office/drawing/2014/main" val="10000"/>
+                    <a16:rowId xmlns:a16="http://schemas.microsoft.com/office/drawing/2014/main" val="10000"/>
                   </a:ext>
                 </a:extLst>
               </a:tr>
@@ -32875,7 +32837,7 @@
                 </a:tc>
                 <a:extLst>
                   <a:ext uri="{0D108BD9-81ED-4DB2-BD59-A6C34878D82A}">
-                    <a16:rowId xmlns="" xmlns:a16="http://schemas.microsoft.com/office/drawing/2014/main" val="10001"/>
+                    <a16:rowId xmlns:a16="http://schemas.microsoft.com/office/drawing/2014/main" val="10001"/>
                   </a:ext>
                 </a:extLst>
               </a:tr>
@@ -32953,7 +32915,7 @@
                 </a:tc>
                 <a:extLst>
                   <a:ext uri="{0D108BD9-81ED-4DB2-BD59-A6C34878D82A}">
-                    <a16:rowId xmlns="" xmlns:a16="http://schemas.microsoft.com/office/drawing/2014/main" val="10002"/>
+                    <a16:rowId xmlns:a16="http://schemas.microsoft.com/office/drawing/2014/main" val="10002"/>
                   </a:ext>
                 </a:extLst>
               </a:tr>
@@ -33031,7 +32993,7 @@
                 </a:tc>
                 <a:extLst>
                   <a:ext uri="{0D108BD9-81ED-4DB2-BD59-A6C34878D82A}">
-                    <a16:rowId xmlns="" xmlns:a16="http://schemas.microsoft.com/office/drawing/2014/main" val="10007"/>
+                    <a16:rowId xmlns:a16="http://schemas.microsoft.com/office/drawing/2014/main" val="10007"/>
                   </a:ext>
                 </a:extLst>
               </a:tr>
@@ -33746,7 +33708,7 @@
                 <a:gridCol w="2373524">
                   <a:extLst>
                     <a:ext uri="{9D8B030D-6E8A-4147-A177-3AD203B41FA5}">
-                      <a16:colId xmlns="" xmlns:a16="http://schemas.microsoft.com/office/drawing/2014/main" val="20000"/>
+                      <a16:colId xmlns:a16="http://schemas.microsoft.com/office/drawing/2014/main" val="20000"/>
                     </a:ext>
                   </a:extLst>
                 </a:gridCol>
@@ -33809,7 +33771,7 @@
                 </a:tc>
                 <a:extLst>
                   <a:ext uri="{0D108BD9-81ED-4DB2-BD59-A6C34878D82A}">
-                    <a16:rowId xmlns="" xmlns:a16="http://schemas.microsoft.com/office/drawing/2014/main" val="10000"/>
+                    <a16:rowId xmlns:a16="http://schemas.microsoft.com/office/drawing/2014/main" val="10000"/>
                   </a:ext>
                 </a:extLst>
               </a:tr>
@@ -33870,7 +33832,7 @@
                 </a:tc>
                 <a:extLst>
                   <a:ext uri="{0D108BD9-81ED-4DB2-BD59-A6C34878D82A}">
-                    <a16:rowId xmlns="" xmlns:a16="http://schemas.microsoft.com/office/drawing/2014/main" val="10001"/>
+                    <a16:rowId xmlns:a16="http://schemas.microsoft.com/office/drawing/2014/main" val="10001"/>
                   </a:ext>
                 </a:extLst>
               </a:tr>
@@ -33940,7 +33902,7 @@
                 </a:tc>
                 <a:extLst>
                   <a:ext uri="{0D108BD9-81ED-4DB2-BD59-A6C34878D82A}">
-                    <a16:rowId xmlns="" xmlns:a16="http://schemas.microsoft.com/office/drawing/2014/main" val="10002"/>
+                    <a16:rowId xmlns:a16="http://schemas.microsoft.com/office/drawing/2014/main" val="10002"/>
                   </a:ext>
                 </a:extLst>
               </a:tr>
@@ -34018,7 +33980,7 @@
                 </a:tc>
                 <a:extLst>
                   <a:ext uri="{0D108BD9-81ED-4DB2-BD59-A6C34878D82A}">
-                    <a16:rowId xmlns="" xmlns:a16="http://schemas.microsoft.com/office/drawing/2014/main" val="10007"/>
+                    <a16:rowId xmlns:a16="http://schemas.microsoft.com/office/drawing/2014/main" val="10007"/>
                   </a:ext>
                 </a:extLst>
               </a:tr>
@@ -35878,15 +35840,7 @@
           <a:p>
             <a:r>
               <a:rPr lang="en-US" dirty="0" smtClean="0"/>
-              <a:t>Contoso </a:t>
-            </a:r>
-            <a:r>
-              <a:rPr lang="en-US" dirty="0" smtClean="0"/>
-              <a:t>Office 365 </a:t>
-            </a:r>
-            <a:r>
-              <a:rPr lang="en-US" dirty="0" smtClean="0"/>
-              <a:t>logical architecture</a:t>
+              <a:t>Contoso Office 365 logical architecture</a:t>
             </a:r>
             <a:endParaRPr lang="nl-BE" dirty="0"/>
           </a:p>
@@ -39365,18 +39319,7 @@
                 </a:solidFill>
                 <a:cs typeface="Segoe UI" panose="020B0502040204020203" pitchFamily="34" charset="0"/>
               </a:rPr>
-              <a:t>Chosen hosting platform impacts the detailed design of the capabilities for </a:t>
-            </a:r>
-            <a:r>
-              <a:rPr lang="en-US" sz="1400" dirty="0" smtClean="0">
-                <a:solidFill>
-                  <a:schemeClr val="bg2">
-                    <a:lumMod val="50000"/>
-                  </a:schemeClr>
-                </a:solidFill>
-                <a:cs typeface="Segoe UI" panose="020B0502040204020203" pitchFamily="34" charset="0"/>
-              </a:rPr>
-              <a:t>Office 365 </a:t>
+              <a:t>Chosen hosting platform impacts the detailed design of the capabilities for Office 365 </a:t>
             </a:r>
             <a:r>
               <a:rPr lang="en-US" sz="1400" dirty="0">
@@ -44274,7 +44217,7 @@
 </file>
 
 <file path=ppt/slides/slide65.xml><?xml version="1.0" encoding="utf-8"?>
-<p:sld xmlns:a="http://schemas.openxmlformats.org/drawingml/2006/main" xmlns:r="http://schemas.openxmlformats.org/officeDocument/2006/relationships" xmlns:p="http://schemas.openxmlformats.org/presentationml/2006/main">
+<p:sld xmlns:a="http://schemas.openxmlformats.org/drawingml/2006/main" xmlns:r="http://schemas.openxmlformats.org/officeDocument/2006/relationships" xmlns:p="http://schemas.openxmlformats.org/presentationml/2006/main" show="0">
   <p:cSld>
     <p:spTree>
       <p:nvGrpSpPr>
@@ -44471,7 +44414,7 @@
           <a:p>
             <a:pPr defTabSz="913737" eaLnBrk="0" hangingPunct="0"/>
             <a:r>
-              <a:rPr lang="en-US" sz="686" dirty="0">
+              <a:rPr lang="en-US" sz="686">
                 <a:gradFill>
                   <a:gsLst>
                     <a:gs pos="0">
@@ -44488,7 +44431,7 @@
               <a:t>© </a:t>
             </a:r>
             <a:r>
-              <a:rPr lang="en-US" sz="686" dirty="0" smtClean="0">
+              <a:rPr lang="en-US" sz="686" smtClean="0">
                 <a:gradFill>
                   <a:gsLst>
                     <a:gs pos="0">
@@ -44502,7 +44445,7 @@
                 </a:gradFill>
                 <a:cs typeface="Segoe UI" pitchFamily="34" charset="0"/>
               </a:rPr>
-              <a:t>2014 </a:t>
+              <a:t>2015 </a:t>
             </a:r>
             <a:r>
               <a:rPr lang="en-US" sz="686" dirty="0">
@@ -44819,10 +44762,34 @@
                 <a:tableStyleId>{5C22544A-7EE6-4342-B048-85BDC9FD1C3A}</a:tableStyleId>
               </a:tblPr>
               <a:tblGrid>
-                <a:gridCol w="2794925"/>
-                <a:gridCol w="2683565"/>
-                <a:gridCol w="2623930"/>
-                <a:gridCol w="2855843"/>
+                <a:gridCol w="2794925">
+                  <a:extLst>
+                    <a:ext uri="{9D8B030D-6E8A-4147-A177-3AD203B41FA5}">
+                      <a16:colId xmlns:a16="http://schemas.microsoft.com/office/drawing/2014/main" val="20000"/>
+                    </a:ext>
+                  </a:extLst>
+                </a:gridCol>
+                <a:gridCol w="2683565">
+                  <a:extLst>
+                    <a:ext uri="{9D8B030D-6E8A-4147-A177-3AD203B41FA5}">
+                      <a16:colId xmlns:a16="http://schemas.microsoft.com/office/drawing/2014/main" val="20001"/>
+                    </a:ext>
+                  </a:extLst>
+                </a:gridCol>
+                <a:gridCol w="2623930">
+                  <a:extLst>
+                    <a:ext uri="{9D8B030D-6E8A-4147-A177-3AD203B41FA5}">
+                      <a16:colId xmlns:a16="http://schemas.microsoft.com/office/drawing/2014/main" val="20002"/>
+                    </a:ext>
+                  </a:extLst>
+                </a:gridCol>
+                <a:gridCol w="2855843">
+                  <a:extLst>
+                    <a:ext uri="{9D8B030D-6E8A-4147-A177-3AD203B41FA5}">
+                      <a16:colId xmlns:a16="http://schemas.microsoft.com/office/drawing/2014/main" val="20003"/>
+                    </a:ext>
+                  </a:extLst>
+                </a:gridCol>
               </a:tblGrid>
               <a:tr h="185372">
                 <a:tc rowSpan="2">
@@ -45034,6 +45001,11 @@
                     </a:solidFill>
                   </a:tcPr>
                 </a:tc>
+                <a:extLst>
+                  <a:ext uri="{0D108BD9-81ED-4DB2-BD59-A6C34878D82A}">
+                    <a16:rowId xmlns:a16="http://schemas.microsoft.com/office/drawing/2014/main" val="10000"/>
+                  </a:ext>
+                </a:extLst>
               </a:tr>
               <a:tr h="185372">
                 <a:tc vMerge="1">
@@ -45241,6 +45213,11 @@
                     </a:solidFill>
                   </a:tcPr>
                 </a:tc>
+                <a:extLst>
+                  <a:ext uri="{0D108BD9-81ED-4DB2-BD59-A6C34878D82A}">
+                    <a16:rowId xmlns:a16="http://schemas.microsoft.com/office/drawing/2014/main" val="10001"/>
+                  </a:ext>
+                </a:extLst>
               </a:tr>
               <a:tr h="1264591">
                 <a:tc>
@@ -45821,6 +45798,11 @@
                     <a:noFill/>
                   </a:tcPr>
                 </a:tc>
+                <a:extLst>
+                  <a:ext uri="{0D108BD9-81ED-4DB2-BD59-A6C34878D82A}">
+                    <a16:rowId xmlns:a16="http://schemas.microsoft.com/office/drawing/2014/main" val="10002"/>
+                  </a:ext>
+                </a:extLst>
               </a:tr>
             </a:tbl>
           </a:graphicData>
@@ -50776,15 +50758,6 @@
 </file>
 
 <file path=customXml/item1.xml><?xml version="1.0" encoding="utf-8"?>
-<?mso-contentType ?>
-<FormTemplates xmlns="http://schemas.microsoft.com/sharepoint/v3/contenttype/forms">
-  <Display>DocumentLibraryForm</Display>
-  <Edit>DocumentLibraryForm</Edit>
-  <New>DocumentLibraryForm</New>
-</FormTemplates>
-</file>
-
-<file path=customXml/item2.xml><?xml version="1.0" encoding="utf-8"?>
 <ct:contentTypeSchema xmlns:ct="http://schemas.microsoft.com/office/2006/metadata/contentType" xmlns:ma="http://schemas.microsoft.com/office/2006/metadata/properties/metaAttributes" ct:_="" ma:_="" ma:contentTypeName="Document" ma:contentTypeID="0x010100DD7BFE2324FCFB49A665688E9D54E8DB" ma:contentTypeVersion="2" ma:contentTypeDescription="Create a new document." ma:contentTypeScope="" ma:versionID="d40ecbfa05608dbb8df02efb84158178">
   <xsd:schema xmlns:xsd="http://www.w3.org/2001/XMLSchema" xmlns:xs="http://www.w3.org/2001/XMLSchema" xmlns:p="http://schemas.microsoft.com/office/2006/metadata/properties" xmlns:ns2="5ec9502b-addf-4716-883a-9e6742fd5109" targetNamespace="http://schemas.microsoft.com/office/2006/metadata/properties" ma:root="true" ma:fieldsID="c8929b4bbf02ed04f4fe894b226e94c0" ns2:_="">
     <xsd:import namespace="5ec9502b-addf-4716-883a-9e6742fd5109"/>
@@ -50930,13 +50903,13 @@
 </ct:contentTypeSchema>
 </file>
 
-<file path=customXml/item3.xml><?xml version="1.0" encoding="utf-8"?>
+<file path=customXml/item2.xml><?xml version="1.0" encoding="utf-8"?>
 <Control xmlns="http://schemas.microsoft.com/VisualStudio/2011/storyboarding/control">
   <Id Name="System.Storyboarding.Backgrounds.WebBrowser" Revision="1" Stencil="System.Storyboarding.Backgrounds" StencilVersion="0.1"/>
 </Control>
 </file>
 
-<file path=customXml/item4.xml><?xml version="1.0" encoding="utf-8"?>
+<file path=customXml/item3.xml><?xml version="1.0" encoding="utf-8"?>
 <p:properties xmlns:p="http://schemas.microsoft.com/office/2006/metadata/properties" xmlns:xsi="http://www.w3.org/2001/XMLSchema-instance" xmlns:pc="http://schemas.microsoft.com/office/infopath/2007/PartnerControls">
   <documentManagement>
     <SharedWithUsers xmlns="5ec9502b-addf-4716-883a-9e6742fd5109">
@@ -50951,10 +50924,19 @@
 </p:properties>
 </file>
 
-<file path=customXml/item5.xml><?xml version="1.0" encoding="utf-8"?>
+<file path=customXml/item4.xml><?xml version="1.0" encoding="utf-8"?>
 <Control xmlns="http://schemas.microsoft.com/VisualStudio/2011/storyboarding/control">
   <Id Name="System.Storyboarding.Backgrounds.WebBrowser" Revision="1" Stencil="System.Storyboarding.Backgrounds" StencilVersion="0.1"/>
 </Control>
+</file>
+
+<file path=customXml/item5.xml><?xml version="1.0" encoding="utf-8"?>
+<?mso-contentType ?>
+<FormTemplates xmlns="http://schemas.microsoft.com/sharepoint/v3/contenttype/forms">
+  <Display>DocumentLibraryForm</Display>
+  <Edit>DocumentLibraryForm</Edit>
+  <New>DocumentLibraryForm</New>
+</FormTemplates>
 </file>
 
 <file path=customXml/item6.xml><?xml version="1.0" encoding="utf-8"?>
@@ -50964,14 +50946,6 @@
 </file>
 
 <file path=customXml/itemProps1.xml><?xml version="1.0" encoding="utf-8"?>
-<ds:datastoreItem xmlns:ds="http://schemas.openxmlformats.org/officeDocument/2006/customXml" ds:itemID="{B4606E04-852E-4880-8CD1-0B186F4087B1}">
-  <ds:schemaRefs>
-    <ds:schemaRef ds:uri="http://schemas.microsoft.com/sharepoint/v3/contenttype/forms"/>
-  </ds:schemaRefs>
-</ds:datastoreItem>
-</file>
-
-<file path=customXml/itemProps2.xml><?xml version="1.0" encoding="utf-8"?>
 <ds:datastoreItem xmlns:ds="http://schemas.openxmlformats.org/officeDocument/2006/customXml" ds:itemID="{F79724C6-F6AC-4965-8DDA-67169DE5A52B}">
   <ds:schemaRefs>
     <ds:schemaRef ds:uri="http://schemas.microsoft.com/office/2006/metadata/contentType"/>
@@ -50989,15 +50963,15 @@
 </ds:datastoreItem>
 </file>
 
-<file path=customXml/itemProps3.xml><?xml version="1.0" encoding="utf-8"?>
-<ds:datastoreItem xmlns:ds="http://schemas.openxmlformats.org/officeDocument/2006/customXml" ds:itemID="{CE030D2D-A334-4C40-95AD-E97580D89B11}">
+<file path=customXml/itemProps2.xml><?xml version="1.0" encoding="utf-8"?>
+<ds:datastoreItem xmlns:ds="http://schemas.openxmlformats.org/officeDocument/2006/customXml" ds:itemID="{57ED2E3B-EB43-4252-8C73-98EA6ACC344E}">
   <ds:schemaRefs>
     <ds:schemaRef ds:uri="http://schemas.microsoft.com/VisualStudio/2011/storyboarding/control"/>
   </ds:schemaRefs>
 </ds:datastoreItem>
 </file>
 
-<file path=customXml/itemProps4.xml><?xml version="1.0" encoding="utf-8"?>
+<file path=customXml/itemProps3.xml><?xml version="1.0" encoding="utf-8"?>
 <ds:datastoreItem xmlns:ds="http://schemas.openxmlformats.org/officeDocument/2006/customXml" ds:itemID="{F1AEA8A7-A694-4DB0-82AB-EF48F2E9B6F9}">
   <ds:schemaRefs>
     <ds:schemaRef ds:uri="http://purl.org/dc/terms/"/>
@@ -51013,10 +50987,18 @@
 </ds:datastoreItem>
 </file>
 
-<file path=customXml/itemProps5.xml><?xml version="1.0" encoding="utf-8"?>
-<ds:datastoreItem xmlns:ds="http://schemas.openxmlformats.org/officeDocument/2006/customXml" ds:itemID="{57ED2E3B-EB43-4252-8C73-98EA6ACC344E}">
+<file path=customXml/itemProps4.xml><?xml version="1.0" encoding="utf-8"?>
+<ds:datastoreItem xmlns:ds="http://schemas.openxmlformats.org/officeDocument/2006/customXml" ds:itemID="{CE030D2D-A334-4C40-95AD-E97580D89B11}">
   <ds:schemaRefs>
     <ds:schemaRef ds:uri="http://schemas.microsoft.com/VisualStudio/2011/storyboarding/control"/>
+  </ds:schemaRefs>
+</ds:datastoreItem>
+</file>
+
+<file path=customXml/itemProps5.xml><?xml version="1.0" encoding="utf-8"?>
+<ds:datastoreItem xmlns:ds="http://schemas.openxmlformats.org/officeDocument/2006/customXml" ds:itemID="{B4606E04-852E-4880-8CD1-0B186F4087B1}">
+  <ds:schemaRefs>
+    <ds:schemaRef ds:uri="http://schemas.microsoft.com/sharepoint/v3/contenttype/forms"/>
   </ds:schemaRefs>
 </ds:datastoreItem>
 </file>

</xml_diff>